<commit_message>
Add Command Module and Object Classes; implement Real-Time Propagator and simulation commands
</commit_message>
<xml_diff>
--- a/Integrated Masters Project.pptx
+++ b/Integrated Masters Project.pptx
@@ -11,6 +11,7 @@
     <p:sldId id="264" r:id="rId5"/>
     <p:sldId id="265" r:id="rId6"/>
     <p:sldId id="266" r:id="rId7"/>
+    <p:sldId id="267" r:id="rId8"/>
   </p:sldIdLst>
   <p:sldSz cx="12192000" cy="6858000"/>
   <p:notesSz cx="6858000" cy="9144000"/>
@@ -264,7 +265,7 @@
           <a:p>
             <a:fld id="{3E415712-9535-4045-B0C7-D22E271B7415}" type="datetimeFigureOut">
               <a:rPr lang="en-US" smtClean="0"/>
-              <a:t>1/8/2026</a:t>
+              <a:t>1/9/2026</a:t>
             </a:fld>
             <a:endParaRPr lang="en-US"/>
           </a:p>
@@ -462,7 +463,7 @@
           <a:p>
             <a:fld id="{3E415712-9535-4045-B0C7-D22E271B7415}" type="datetimeFigureOut">
               <a:rPr lang="en-US" smtClean="0"/>
-              <a:t>1/8/2026</a:t>
+              <a:t>1/9/2026</a:t>
             </a:fld>
             <a:endParaRPr lang="en-US"/>
           </a:p>
@@ -670,7 +671,7 @@
           <a:p>
             <a:fld id="{3E415712-9535-4045-B0C7-D22E271B7415}" type="datetimeFigureOut">
               <a:rPr lang="en-US" smtClean="0"/>
-              <a:t>1/8/2026</a:t>
+              <a:t>1/9/2026</a:t>
             </a:fld>
             <a:endParaRPr lang="en-US"/>
           </a:p>
@@ -868,7 +869,7 @@
           <a:p>
             <a:fld id="{3E415712-9535-4045-B0C7-D22E271B7415}" type="datetimeFigureOut">
               <a:rPr lang="en-US" smtClean="0"/>
-              <a:t>1/8/2026</a:t>
+              <a:t>1/9/2026</a:t>
             </a:fld>
             <a:endParaRPr lang="en-US"/>
           </a:p>
@@ -1143,7 +1144,7 @@
           <a:p>
             <a:fld id="{3E415712-9535-4045-B0C7-D22E271B7415}" type="datetimeFigureOut">
               <a:rPr lang="en-US" smtClean="0"/>
-              <a:t>1/8/2026</a:t>
+              <a:t>1/9/2026</a:t>
             </a:fld>
             <a:endParaRPr lang="en-US"/>
           </a:p>
@@ -1408,7 +1409,7 @@
           <a:p>
             <a:fld id="{3E415712-9535-4045-B0C7-D22E271B7415}" type="datetimeFigureOut">
               <a:rPr lang="en-US" smtClean="0"/>
-              <a:t>1/8/2026</a:t>
+              <a:t>1/9/2026</a:t>
             </a:fld>
             <a:endParaRPr lang="en-US"/>
           </a:p>
@@ -1820,7 +1821,7 @@
           <a:p>
             <a:fld id="{3E415712-9535-4045-B0C7-D22E271B7415}" type="datetimeFigureOut">
               <a:rPr lang="en-US" smtClean="0"/>
-              <a:t>1/8/2026</a:t>
+              <a:t>1/9/2026</a:t>
             </a:fld>
             <a:endParaRPr lang="en-US"/>
           </a:p>
@@ -1961,7 +1962,7 @@
           <a:p>
             <a:fld id="{3E415712-9535-4045-B0C7-D22E271B7415}" type="datetimeFigureOut">
               <a:rPr lang="en-US" smtClean="0"/>
-              <a:t>1/8/2026</a:t>
+              <a:t>1/9/2026</a:t>
             </a:fld>
             <a:endParaRPr lang="en-US"/>
           </a:p>
@@ -2074,7 +2075,7 @@
           <a:p>
             <a:fld id="{3E415712-9535-4045-B0C7-D22E271B7415}" type="datetimeFigureOut">
               <a:rPr lang="en-US" smtClean="0"/>
-              <a:t>1/8/2026</a:t>
+              <a:t>1/9/2026</a:t>
             </a:fld>
             <a:endParaRPr lang="en-US"/>
           </a:p>
@@ -2385,7 +2386,7 @@
           <a:p>
             <a:fld id="{3E415712-9535-4045-B0C7-D22E271B7415}" type="datetimeFigureOut">
               <a:rPr lang="en-US" smtClean="0"/>
-              <a:t>1/8/2026</a:t>
+              <a:t>1/9/2026</a:t>
             </a:fld>
             <a:endParaRPr lang="en-US"/>
           </a:p>
@@ -2673,7 +2674,7 @@
           <a:p>
             <a:fld id="{3E415712-9535-4045-B0C7-D22E271B7415}" type="datetimeFigureOut">
               <a:rPr lang="en-US" smtClean="0"/>
-              <a:t>1/8/2026</a:t>
+              <a:t>1/9/2026</a:t>
             </a:fld>
             <a:endParaRPr lang="en-US"/>
           </a:p>
@@ -2914,7 +2915,7 @@
           <a:p>
             <a:fld id="{3E415712-9535-4045-B0C7-D22E271B7415}" type="datetimeFigureOut">
               <a:rPr lang="en-US" smtClean="0"/>
-              <a:t>1/8/2026</a:t>
+              <a:t>1/9/2026</a:t>
             </a:fld>
             <a:endParaRPr lang="en-US"/>
           </a:p>
@@ -11920,6 +11921,552 @@
     <p:extLst>
       <p:ext uri="{BB962C8B-B14F-4D97-AF65-F5344CB8AC3E}">
         <p14:creationId xmlns:p14="http://schemas.microsoft.com/office/powerpoint/2010/main" val="174448397"/>
+      </p:ext>
+    </p:extLst>
+  </p:cSld>
+  <p:clrMapOvr>
+    <a:masterClrMapping/>
+  </p:clrMapOvr>
+</p:sld>
+</file>
+
+<file path=ppt/slides/slide7.xml><?xml version="1.0" encoding="utf-8"?>
+<p:sld xmlns:a="http://schemas.openxmlformats.org/drawingml/2006/main" xmlns:r="http://schemas.openxmlformats.org/officeDocument/2006/relationships" xmlns:p="http://schemas.openxmlformats.org/presentationml/2006/main">
+  <p:cSld>
+    <p:spTree>
+      <p:nvGrpSpPr>
+        <p:cNvPr id="1" name=""/>
+        <p:cNvGrpSpPr/>
+        <p:nvPr/>
+      </p:nvGrpSpPr>
+      <p:grpSpPr>
+        <a:xfrm>
+          <a:off x="0" y="0"/>
+          <a:ext cx="0" cy="0"/>
+          <a:chOff x="0" y="0"/>
+          <a:chExt cx="0" cy="0"/>
+        </a:xfrm>
+      </p:grpSpPr>
+      <p:sp>
+        <p:nvSpPr>
+          <p:cNvPr id="2" name="Rectangle 1">
+            <a:extLst>
+              <a:ext uri="{FF2B5EF4-FFF2-40B4-BE49-F238E27FC236}">
+                <a16:creationId xmlns:a16="http://schemas.microsoft.com/office/drawing/2014/main" id="{785EA5C9-D7B9-682C-363F-19FCB2EACC10}"/>
+              </a:ext>
+            </a:extLst>
+          </p:cNvPr>
+          <p:cNvSpPr/>
+          <p:nvPr/>
+        </p:nvSpPr>
+        <p:spPr>
+          <a:xfrm>
+            <a:off x="3825572" y="842444"/>
+            <a:ext cx="2779459" cy="505809"/>
+          </a:xfrm>
+          <a:prstGeom prst="rect">
+            <a:avLst/>
+          </a:prstGeom>
+          <a:solidFill>
+            <a:schemeClr val="bg2">
+              <a:lumMod val="75000"/>
+            </a:schemeClr>
+          </a:solidFill>
+          <a:ln>
+            <a:solidFill>
+              <a:schemeClr val="tx1"/>
+            </a:solidFill>
+          </a:ln>
+        </p:spPr>
+        <p:style>
+          <a:lnRef idx="2">
+            <a:schemeClr val="accent1">
+              <a:shade val="15000"/>
+            </a:schemeClr>
+          </a:lnRef>
+          <a:fillRef idx="1">
+            <a:schemeClr val="accent1"/>
+          </a:fillRef>
+          <a:effectRef idx="0">
+            <a:schemeClr val="accent1"/>
+          </a:effectRef>
+          <a:fontRef idx="minor">
+            <a:schemeClr val="lt1"/>
+          </a:fontRef>
+        </p:style>
+        <p:txBody>
+          <a:bodyPr rtlCol="0" anchor="t"/>
+          <a:lstStyle/>
+          <a:p>
+            <a:r>
+              <a:rPr lang="en-US" sz="800" dirty="0">
+                <a:solidFill>
+                  <a:schemeClr val="tx1"/>
+                </a:solidFill>
+              </a:rPr>
+              <a:t>Integrator</a:t>
+            </a:r>
+          </a:p>
+        </p:txBody>
+      </p:sp>
+      <p:sp>
+        <p:nvSpPr>
+          <p:cNvPr id="3" name="Rectangle 2">
+            <a:extLst>
+              <a:ext uri="{FF2B5EF4-FFF2-40B4-BE49-F238E27FC236}">
+                <a16:creationId xmlns:a16="http://schemas.microsoft.com/office/drawing/2014/main" id="{6444955A-557B-8DA0-FB6D-DE10CE56865E}"/>
+              </a:ext>
+            </a:extLst>
+          </p:cNvPr>
+          <p:cNvSpPr/>
+          <p:nvPr/>
+        </p:nvSpPr>
+        <p:spPr>
+          <a:xfrm>
+            <a:off x="1002419" y="2322368"/>
+            <a:ext cx="1788078" cy="1552008"/>
+          </a:xfrm>
+          <a:prstGeom prst="rect">
+            <a:avLst/>
+          </a:prstGeom>
+          <a:solidFill>
+            <a:schemeClr val="bg2">
+              <a:lumMod val="75000"/>
+            </a:schemeClr>
+          </a:solidFill>
+          <a:ln>
+            <a:solidFill>
+              <a:schemeClr val="tx1"/>
+            </a:solidFill>
+          </a:ln>
+        </p:spPr>
+        <p:style>
+          <a:lnRef idx="2">
+            <a:schemeClr val="accent1">
+              <a:shade val="15000"/>
+            </a:schemeClr>
+          </a:lnRef>
+          <a:fillRef idx="1">
+            <a:schemeClr val="accent1"/>
+          </a:fillRef>
+          <a:effectRef idx="0">
+            <a:schemeClr val="accent1"/>
+          </a:effectRef>
+          <a:fontRef idx="minor">
+            <a:schemeClr val="lt1"/>
+          </a:fontRef>
+        </p:style>
+        <p:txBody>
+          <a:bodyPr rtlCol="0" anchor="t"/>
+          <a:lstStyle/>
+          <a:p>
+            <a:r>
+              <a:rPr lang="en-US" sz="800" dirty="0">
+                <a:solidFill>
+                  <a:schemeClr val="tx1"/>
+                </a:solidFill>
+              </a:rPr>
+              <a:t>Spacecraft</a:t>
+            </a:r>
+          </a:p>
+          <a:p>
+            <a:r>
+              <a:rPr lang="en-US" sz="600">
+                <a:solidFill>
+                  <a:schemeClr val="tx1"/>
+                </a:solidFill>
+              </a:rPr>
+              <a:t>Perform_</a:t>
+            </a:r>
+            <a:r>
+              <a:rPr lang="en-US" sz="600" dirty="0">
+                <a:solidFill>
+                  <a:schemeClr val="tx1"/>
+                </a:solidFill>
+              </a:rPr>
+              <a:t>Impulsive_burn()</a:t>
+            </a:r>
+          </a:p>
+          <a:p>
+            <a:r>
+              <a:rPr lang="en-US" sz="600" dirty="0">
+                <a:solidFill>
+                  <a:schemeClr val="tx1"/>
+                </a:solidFill>
+              </a:rPr>
+              <a:t>Perform_Maneuver()</a:t>
+            </a:r>
+          </a:p>
+          <a:p>
+            <a:r>
+              <a:rPr lang="en-US" sz="600" dirty="0">
+                <a:solidFill>
+                  <a:schemeClr val="tx1"/>
+                </a:solidFill>
+              </a:rPr>
+              <a:t>Perform_AttitudeChangeManeuver() </a:t>
+            </a:r>
+          </a:p>
+          <a:p>
+            <a:r>
+              <a:rPr lang="en-US" sz="600" dirty="0">
+                <a:solidFill>
+                  <a:schemeClr val="tx1"/>
+                </a:solidFill>
+              </a:rPr>
+              <a:t>Perform_ReactionWheelDesaturation():</a:t>
+            </a:r>
+          </a:p>
+          <a:p>
+            <a:r>
+              <a:rPr lang="en-US" sz="600" dirty="0">
+                <a:solidFill>
+                  <a:schemeClr val="tx1"/>
+                </a:solidFill>
+              </a:rPr>
+              <a:t>Perform_Communications():</a:t>
+            </a:r>
+          </a:p>
+          <a:p>
+            <a:r>
+              <a:rPr lang="en-US" sz="600" dirty="0">
+                <a:solidFill>
+                  <a:schemeClr val="tx1"/>
+                </a:solidFill>
+              </a:rPr>
+              <a:t>Perform_Downlink():</a:t>
+            </a:r>
+          </a:p>
+          <a:p>
+            <a:r>
+              <a:rPr lang="en-US" sz="600" dirty="0">
+                <a:solidFill>
+                  <a:schemeClr val="tx1"/>
+                </a:solidFill>
+              </a:rPr>
+              <a:t>Perform_Crosslink():</a:t>
+            </a:r>
+          </a:p>
+          <a:p>
+            <a:r>
+              <a:rPr lang="en-US" sz="600" dirty="0">
+                <a:solidFill>
+                  <a:schemeClr val="tx1"/>
+                </a:solidFill>
+              </a:rPr>
+              <a:t>Perform_CommandCancel():</a:t>
+            </a:r>
+          </a:p>
+          <a:p>
+            <a:r>
+              <a:rPr lang="en-US" sz="600" dirty="0">
+                <a:solidFill>
+                  <a:schemeClr val="tx1"/>
+                </a:solidFill>
+              </a:rPr>
+              <a:t>Perform_StationKeeping():</a:t>
+            </a:r>
+          </a:p>
+          <a:p>
+            <a:r>
+              <a:rPr lang="en-US" sz="600" dirty="0">
+                <a:solidFill>
+                  <a:schemeClr val="tx1"/>
+                </a:solidFill>
+              </a:rPr>
+              <a:t>Perform_SafeMode():</a:t>
+            </a:r>
+          </a:p>
+          <a:p>
+            <a:r>
+              <a:rPr lang="en-US" sz="600" dirty="0">
+                <a:solidFill>
+                  <a:schemeClr val="tx1"/>
+                </a:solidFill>
+              </a:rPr>
+              <a:t>Perform_StartUp():</a:t>
+            </a:r>
+          </a:p>
+          <a:p>
+            <a:r>
+              <a:rPr lang="en-US" sz="600" dirty="0">
+                <a:solidFill>
+                  <a:schemeClr val="tx1"/>
+                </a:solidFill>
+              </a:rPr>
+              <a:t>Perform_BuiltInTest():</a:t>
+            </a:r>
+          </a:p>
+          <a:p>
+            <a:r>
+              <a:rPr lang="en-US" sz="600" dirty="0">
+                <a:solidFill>
+                  <a:schemeClr val="tx1"/>
+                </a:solidFill>
+              </a:rPr>
+              <a:t>…</a:t>
+            </a:r>
+          </a:p>
+        </p:txBody>
+      </p:sp>
+      <p:sp>
+        <p:nvSpPr>
+          <p:cNvPr id="4" name="Rectangle 3">
+            <a:extLst>
+              <a:ext uri="{FF2B5EF4-FFF2-40B4-BE49-F238E27FC236}">
+                <a16:creationId xmlns:a16="http://schemas.microsoft.com/office/drawing/2014/main" id="{1920CCB9-68AE-E89F-8F40-BAB2F91588DF}"/>
+              </a:ext>
+            </a:extLst>
+          </p:cNvPr>
+          <p:cNvSpPr/>
+          <p:nvPr/>
+        </p:nvSpPr>
+        <p:spPr>
+          <a:xfrm>
+            <a:off x="5435847" y="2091648"/>
+            <a:ext cx="1645920" cy="999673"/>
+          </a:xfrm>
+          <a:prstGeom prst="rect">
+            <a:avLst/>
+          </a:prstGeom>
+          <a:solidFill>
+            <a:schemeClr val="bg2">
+              <a:lumMod val="75000"/>
+            </a:schemeClr>
+          </a:solidFill>
+          <a:ln>
+            <a:solidFill>
+              <a:schemeClr val="tx1"/>
+            </a:solidFill>
+          </a:ln>
+        </p:spPr>
+        <p:style>
+          <a:lnRef idx="2">
+            <a:schemeClr val="accent1">
+              <a:shade val="15000"/>
+            </a:schemeClr>
+          </a:lnRef>
+          <a:fillRef idx="1">
+            <a:schemeClr val="accent1"/>
+          </a:fillRef>
+          <a:effectRef idx="0">
+            <a:schemeClr val="accent1"/>
+          </a:effectRef>
+          <a:fontRef idx="minor">
+            <a:schemeClr val="lt1"/>
+          </a:fontRef>
+        </p:style>
+        <p:txBody>
+          <a:bodyPr rtlCol="0" anchor="t"/>
+          <a:lstStyle/>
+          <a:p>
+            <a:r>
+              <a:rPr lang="en-US" sz="800" dirty="0">
+                <a:solidFill>
+                  <a:schemeClr val="tx1"/>
+                </a:solidFill>
+              </a:rPr>
+              <a:t>Planetary Body</a:t>
+            </a:r>
+          </a:p>
+        </p:txBody>
+      </p:sp>
+      <p:sp>
+        <p:nvSpPr>
+          <p:cNvPr id="5" name="Rectangle 4">
+            <a:extLst>
+              <a:ext uri="{FF2B5EF4-FFF2-40B4-BE49-F238E27FC236}">
+                <a16:creationId xmlns:a16="http://schemas.microsoft.com/office/drawing/2014/main" id="{AE4886BC-F11A-F2EE-8757-12E9D9504591}"/>
+              </a:ext>
+            </a:extLst>
+          </p:cNvPr>
+          <p:cNvSpPr/>
+          <p:nvPr/>
+        </p:nvSpPr>
+        <p:spPr>
+          <a:xfrm>
+            <a:off x="2983619" y="2723074"/>
+            <a:ext cx="1788078" cy="1552008"/>
+          </a:xfrm>
+          <a:prstGeom prst="rect">
+            <a:avLst/>
+          </a:prstGeom>
+          <a:solidFill>
+            <a:schemeClr val="bg2">
+              <a:lumMod val="75000"/>
+            </a:schemeClr>
+          </a:solidFill>
+          <a:ln>
+            <a:solidFill>
+              <a:schemeClr val="tx1"/>
+            </a:solidFill>
+          </a:ln>
+        </p:spPr>
+        <p:style>
+          <a:lnRef idx="2">
+            <a:schemeClr val="accent1">
+              <a:shade val="15000"/>
+            </a:schemeClr>
+          </a:lnRef>
+          <a:fillRef idx="1">
+            <a:schemeClr val="accent1"/>
+          </a:fillRef>
+          <a:effectRef idx="0">
+            <a:schemeClr val="accent1"/>
+          </a:effectRef>
+          <a:fontRef idx="minor">
+            <a:schemeClr val="lt1"/>
+          </a:fontRef>
+        </p:style>
+        <p:txBody>
+          <a:bodyPr rtlCol="0" anchor="t"/>
+          <a:lstStyle/>
+          <a:p>
+            <a:r>
+              <a:rPr lang="en-US" sz="800" dirty="0">
+                <a:solidFill>
+                  <a:schemeClr val="tx1"/>
+                </a:solidFill>
+              </a:rPr>
+              <a:t>Simulation</a:t>
+            </a:r>
+          </a:p>
+          <a:p>
+            <a:r>
+              <a:rPr lang="en-US" sz="600" dirty="0">
+                <a:solidFill>
+                  <a:schemeClr val="tx1"/>
+                </a:solidFill>
+              </a:rPr>
+              <a:t>Perform_ Pause()</a:t>
+            </a:r>
+          </a:p>
+          <a:p>
+            <a:r>
+              <a:rPr lang="en-US" sz="600" dirty="0">
+                <a:solidFill>
+                  <a:schemeClr val="tx1"/>
+                </a:solidFill>
+              </a:rPr>
+              <a:t>Perform_ Stop()</a:t>
+            </a:r>
+          </a:p>
+          <a:p>
+            <a:r>
+              <a:rPr lang="en-US" sz="600" dirty="0">
+                <a:solidFill>
+                  <a:schemeClr val="tx1"/>
+                </a:solidFill>
+              </a:rPr>
+              <a:t>Perform_AttitudeChangeManeuver() </a:t>
+            </a:r>
+          </a:p>
+          <a:p>
+            <a:r>
+              <a:rPr lang="en-US" sz="600" dirty="0">
+                <a:solidFill>
+                  <a:schemeClr val="tx1"/>
+                </a:solidFill>
+              </a:rPr>
+              <a:t>Perform_ReactionWheelDesaturation():</a:t>
+            </a:r>
+          </a:p>
+          <a:p>
+            <a:r>
+              <a:rPr lang="en-US" sz="600" dirty="0">
+                <a:solidFill>
+                  <a:schemeClr val="tx1"/>
+                </a:solidFill>
+              </a:rPr>
+              <a:t>Perform_Communications():</a:t>
+            </a:r>
+          </a:p>
+          <a:p>
+            <a:r>
+              <a:rPr lang="en-US" sz="600" dirty="0">
+                <a:solidFill>
+                  <a:schemeClr val="tx1"/>
+                </a:solidFill>
+              </a:rPr>
+              <a:t>Perform_Downlink():</a:t>
+            </a:r>
+          </a:p>
+          <a:p>
+            <a:r>
+              <a:rPr lang="en-US" sz="600" dirty="0">
+                <a:solidFill>
+                  <a:schemeClr val="tx1"/>
+                </a:solidFill>
+              </a:rPr>
+              <a:t>Perform_Crosslink():</a:t>
+            </a:r>
+          </a:p>
+          <a:p>
+            <a:r>
+              <a:rPr lang="en-US" sz="600" dirty="0">
+                <a:solidFill>
+                  <a:schemeClr val="tx1"/>
+                </a:solidFill>
+              </a:rPr>
+              <a:t>Perform_CommandCancel():</a:t>
+            </a:r>
+          </a:p>
+          <a:p>
+            <a:r>
+              <a:rPr lang="en-US" sz="600" dirty="0">
+                <a:solidFill>
+                  <a:schemeClr val="tx1"/>
+                </a:solidFill>
+              </a:rPr>
+              <a:t>Perform_StationKeeping():</a:t>
+            </a:r>
+          </a:p>
+          <a:p>
+            <a:r>
+              <a:rPr lang="en-US" sz="600" dirty="0">
+                <a:solidFill>
+                  <a:schemeClr val="tx1"/>
+                </a:solidFill>
+              </a:rPr>
+              <a:t>Perform_SafeMode():</a:t>
+            </a:r>
+          </a:p>
+          <a:p>
+            <a:r>
+              <a:rPr lang="en-US" sz="600" dirty="0">
+                <a:solidFill>
+                  <a:schemeClr val="tx1"/>
+                </a:solidFill>
+              </a:rPr>
+              <a:t>Perform_StartUp():</a:t>
+            </a:r>
+          </a:p>
+          <a:p>
+            <a:r>
+              <a:rPr lang="en-US" sz="600" dirty="0">
+                <a:solidFill>
+                  <a:schemeClr val="tx1"/>
+                </a:solidFill>
+              </a:rPr>
+              <a:t>Perform_BuiltInTest():</a:t>
+            </a:r>
+          </a:p>
+          <a:p>
+            <a:r>
+              <a:rPr lang="en-US" sz="600" dirty="0">
+                <a:solidFill>
+                  <a:schemeClr val="tx1"/>
+                </a:solidFill>
+              </a:rPr>
+              <a:t>…</a:t>
+            </a:r>
+          </a:p>
+        </p:txBody>
+      </p:sp>
+    </p:spTree>
+    <p:extLst>
+      <p:ext uri="{BB962C8B-B14F-4D97-AF65-F5344CB8AC3E}">
+        <p14:creationId xmlns:p14="http://schemas.microsoft.com/office/powerpoint/2010/main" val="2695616376"/>
       </p:ext>
     </p:extLst>
   </p:cSld>

</xml_diff>